<commit_message>
SensorManager enhancements and misc enhancemnts
</commit_message>
<xml_diff>
--- a/presentation.pptx
+++ b/presentation.pptx
@@ -5,7 +5,7 @@
     <p:sldMasterId id="2147483660" r:id="rId1"/>
   </p:sldMasterIdLst>
   <p:notesMasterIdLst>
-    <p:notesMasterId r:id="rId8"/>
+    <p:notesMasterId r:id="rId9"/>
   </p:notesMasterIdLst>
   <p:sldIdLst>
     <p:sldId id="256" r:id="rId2"/>
@@ -13,7 +13,8 @@
     <p:sldId id="258" r:id="rId4"/>
     <p:sldId id="259" r:id="rId5"/>
     <p:sldId id="260" r:id="rId6"/>
-    <p:sldId id="261" r:id="rId7"/>
+    <p:sldId id="262" r:id="rId7"/>
+    <p:sldId id="261" r:id="rId8"/>
   </p:sldIdLst>
   <p:sldSz cx="12192000" cy="6858000"/>
   <p:notesSz cx="6858000" cy="9144000"/>
@@ -139,7 +140,7 @@
   <pc:docChgLst>
     <pc:chgData name="Karl La Grassa" userId="598be429c4e50114" providerId="LiveId" clId="{405757E6-D4E6-D044-98D8-0C142B7FD65C}"/>
     <pc:docChg chg="undo redo custSel addSld modSld">
-      <pc:chgData name="Karl La Grassa" userId="598be429c4e50114" providerId="LiveId" clId="{405757E6-D4E6-D044-98D8-0C142B7FD65C}" dt="2021-11-08T18:59:18.675" v="2188" actId="14100"/>
+      <pc:chgData name="Karl La Grassa" userId="598be429c4e50114" providerId="LiveId" clId="{405757E6-D4E6-D044-98D8-0C142B7FD65C}" dt="2021-11-09T13:19:34.965" v="2295" actId="478"/>
       <pc:docMkLst>
         <pc:docMk/>
       </pc:docMkLst>
@@ -167,7 +168,7 @@
         </pc:spChg>
       </pc:sldChg>
       <pc:sldChg chg="addSp modSp new mod addCm delCm modCm modNotesTx">
-        <pc:chgData name="Karl La Grassa" userId="598be429c4e50114" providerId="LiveId" clId="{405757E6-D4E6-D044-98D8-0C142B7FD65C}" dt="2021-11-08T13:46:27.932" v="2180" actId="20577"/>
+        <pc:chgData name="Karl La Grassa" userId="598be429c4e50114" providerId="LiveId" clId="{405757E6-D4E6-D044-98D8-0C142B7FD65C}" dt="2021-11-09T13:18:19.251" v="2260" actId="1037"/>
         <pc:sldMkLst>
           <pc:docMk/>
           <pc:sldMk cId="3461207568" sldId="257"/>
@@ -181,7 +182,7 @@
           </ac:spMkLst>
         </pc:spChg>
         <pc:spChg chg="mod">
-          <ac:chgData name="Karl La Grassa" userId="598be429c4e50114" providerId="LiveId" clId="{405757E6-D4E6-D044-98D8-0C142B7FD65C}" dt="2021-11-08T13:16:11.049" v="2036" actId="20577"/>
+          <ac:chgData name="Karl La Grassa" userId="598be429c4e50114" providerId="LiveId" clId="{405757E6-D4E6-D044-98D8-0C142B7FD65C}" dt="2021-11-09T13:18:11.251" v="2237" actId="20577"/>
           <ac:spMkLst>
             <pc:docMk/>
             <pc:sldMk cId="3461207568" sldId="257"/>
@@ -189,7 +190,7 @@
           </ac:spMkLst>
         </pc:spChg>
         <pc:spChg chg="add mod">
-          <ac:chgData name="Karl La Grassa" userId="598be429c4e50114" providerId="LiveId" clId="{405757E6-D4E6-D044-98D8-0C142B7FD65C}" dt="2021-11-08T13:17:19.990" v="2154" actId="404"/>
+          <ac:chgData name="Karl La Grassa" userId="598be429c4e50114" providerId="LiveId" clId="{405757E6-D4E6-D044-98D8-0C142B7FD65C}" dt="2021-11-09T13:18:19.251" v="2260" actId="1037"/>
           <ac:spMkLst>
             <pc:docMk/>
             <pc:sldMk cId="3461207568" sldId="257"/>
@@ -197,7 +198,7 @@
           </ac:spMkLst>
         </pc:spChg>
         <pc:picChg chg="add mod">
-          <ac:chgData name="Karl La Grassa" userId="598be429c4e50114" providerId="LiveId" clId="{405757E6-D4E6-D044-98D8-0C142B7FD65C}" dt="2021-11-08T13:17:24.222" v="2158" actId="1038"/>
+          <ac:chgData name="Karl La Grassa" userId="598be429c4e50114" providerId="LiveId" clId="{405757E6-D4E6-D044-98D8-0C142B7FD65C}" dt="2021-11-09T13:18:14.741" v="2238" actId="1076"/>
           <ac:picMkLst>
             <pc:docMk/>
             <pc:sldMk cId="3461207568" sldId="257"/>
@@ -401,6 +402,29 @@
           </ac:spMkLst>
         </pc:spChg>
       </pc:sldChg>
+      <pc:sldChg chg="delSp modSp new mod">
+        <pc:chgData name="Karl La Grassa" userId="598be429c4e50114" providerId="LiveId" clId="{405757E6-D4E6-D044-98D8-0C142B7FD65C}" dt="2021-11-09T13:19:34.965" v="2295" actId="478"/>
+        <pc:sldMkLst>
+          <pc:docMk/>
+          <pc:sldMk cId="414114458" sldId="262"/>
+        </pc:sldMkLst>
+        <pc:spChg chg="mod">
+          <ac:chgData name="Karl La Grassa" userId="598be429c4e50114" providerId="LiveId" clId="{405757E6-D4E6-D044-98D8-0C142B7FD65C}" dt="2021-11-09T13:19:31.127" v="2294" actId="20577"/>
+          <ac:spMkLst>
+            <pc:docMk/>
+            <pc:sldMk cId="414114458" sldId="262"/>
+            <ac:spMk id="2" creationId="{8C576343-B052-FA4F-B4B7-949A4BDDF49E}"/>
+          </ac:spMkLst>
+        </pc:spChg>
+        <pc:spChg chg="del">
+          <ac:chgData name="Karl La Grassa" userId="598be429c4e50114" providerId="LiveId" clId="{405757E6-D4E6-D044-98D8-0C142B7FD65C}" dt="2021-11-09T13:19:34.965" v="2295" actId="478"/>
+          <ac:spMkLst>
+            <pc:docMk/>
+            <pc:sldMk cId="414114458" sldId="262"/>
+            <ac:spMk id="3" creationId="{4A46F714-2458-A04C-9447-91602EDF1CBA}"/>
+          </ac:spMkLst>
+        </pc:spChg>
+      </pc:sldChg>
     </pc:docChg>
   </pc:docChgLst>
 </pc:chgInfo>
@@ -488,7 +512,7 @@
           <a:p>
             <a:fld id="{C087B5CB-4C39-3A4F-BE4E-83ACC8C4503F}" type="datetimeFigureOut">
               <a:rPr lang="fr-FR" smtClean="0"/>
-              <a:t>08/11/2021</a:t>
+              <a:t>09/11/2021</a:t>
             </a:fld>
             <a:endParaRPr lang="fr-FR"/>
           </a:p>
@@ -962,7 +986,7 @@
           <a:p>
             <a:fld id="{6465C638-4572-9440-81E7-E059EFD4A429}" type="slidenum">
               <a:rPr lang="fr-FR" smtClean="0"/>
-              <a:t>6</a:t>
+              <a:t>7</a:t>
             </a:fld>
             <a:endParaRPr lang="fr-FR"/>
           </a:p>
@@ -1150,7 +1174,7 @@
           <a:p>
             <a:fld id="{55F56711-D5A6-9E45-BD22-9347A5F03FFE}" type="datetimeFigureOut">
               <a:rPr lang="fr-FR" smtClean="0"/>
-              <a:t>08/11/2021</a:t>
+              <a:t>09/11/2021</a:t>
             </a:fld>
             <a:endParaRPr lang="fr-FR"/>
           </a:p>
@@ -1480,7 +1504,7 @@
           <a:p>
             <a:fld id="{55F56711-D5A6-9E45-BD22-9347A5F03FFE}" type="datetimeFigureOut">
               <a:rPr lang="fr-FR" smtClean="0"/>
-              <a:t>08/11/2021</a:t>
+              <a:t>09/11/2021</a:t>
             </a:fld>
             <a:endParaRPr lang="fr-FR"/>
           </a:p>
@@ -1660,7 +1684,7 @@
           <a:p>
             <a:fld id="{55F56711-D5A6-9E45-BD22-9347A5F03FFE}" type="datetimeFigureOut">
               <a:rPr lang="fr-FR" smtClean="0"/>
-              <a:t>08/11/2021</a:t>
+              <a:t>09/11/2021</a:t>
             </a:fld>
             <a:endParaRPr lang="fr-FR"/>
           </a:p>
@@ -1830,7 +1854,7 @@
           <a:p>
             <a:fld id="{55F56711-D5A6-9E45-BD22-9347A5F03FFE}" type="datetimeFigureOut">
               <a:rPr lang="fr-FR" smtClean="0"/>
-              <a:t>08/11/2021</a:t>
+              <a:t>09/11/2021</a:t>
             </a:fld>
             <a:endParaRPr lang="fr-FR"/>
           </a:p>
@@ -2107,7 +2131,7 @@
           <a:p>
             <a:fld id="{55F56711-D5A6-9E45-BD22-9347A5F03FFE}" type="datetimeFigureOut">
               <a:rPr lang="fr-FR" smtClean="0"/>
-              <a:t>08/11/2021</a:t>
+              <a:t>09/11/2021</a:t>
             </a:fld>
             <a:endParaRPr lang="fr-FR"/>
           </a:p>
@@ -2501,7 +2525,7 @@
           <a:p>
             <a:fld id="{55F56711-D5A6-9E45-BD22-9347A5F03FFE}" type="datetimeFigureOut">
               <a:rPr lang="fr-FR" smtClean="0"/>
-              <a:t>08/11/2021</a:t>
+              <a:t>09/11/2021</a:t>
             </a:fld>
             <a:endParaRPr lang="fr-FR"/>
           </a:p>
@@ -2978,7 +3002,7 @@
           <a:p>
             <a:fld id="{55F56711-D5A6-9E45-BD22-9347A5F03FFE}" type="datetimeFigureOut">
               <a:rPr lang="fr-FR" smtClean="0"/>
-              <a:t>08/11/2021</a:t>
+              <a:t>09/11/2021</a:t>
             </a:fld>
             <a:endParaRPr lang="fr-FR"/>
           </a:p>
@@ -3096,7 +3120,7 @@
           <a:p>
             <a:fld id="{55F56711-D5A6-9E45-BD22-9347A5F03FFE}" type="datetimeFigureOut">
               <a:rPr lang="fr-FR" smtClean="0"/>
-              <a:t>08/11/2021</a:t>
+              <a:t>09/11/2021</a:t>
             </a:fld>
             <a:endParaRPr lang="fr-FR"/>
           </a:p>
@@ -3191,7 +3215,7 @@
           <a:p>
             <a:fld id="{55F56711-D5A6-9E45-BD22-9347A5F03FFE}" type="datetimeFigureOut">
               <a:rPr lang="fr-FR" smtClean="0"/>
-              <a:t>08/11/2021</a:t>
+              <a:t>09/11/2021</a:t>
             </a:fld>
             <a:endParaRPr lang="fr-FR"/>
           </a:p>
@@ -3537,7 +3561,7 @@
           <a:p>
             <a:fld id="{55F56711-D5A6-9E45-BD22-9347A5F03FFE}" type="datetimeFigureOut">
               <a:rPr lang="fr-FR" smtClean="0"/>
-              <a:t>08/11/2021</a:t>
+              <a:t>09/11/2021</a:t>
             </a:fld>
             <a:endParaRPr lang="fr-FR"/>
           </a:p>
@@ -3925,7 +3949,7 @@
           <a:p>
             <a:fld id="{55F56711-D5A6-9E45-BD22-9347A5F03FFE}" type="datetimeFigureOut">
               <a:rPr lang="fr-FR" smtClean="0"/>
-              <a:t>08/11/2021</a:t>
+              <a:t>09/11/2021</a:t>
             </a:fld>
             <a:endParaRPr lang="fr-FR"/>
           </a:p>
@@ -4203,7 +4227,7 @@
           <a:p>
             <a:fld id="{55F56711-D5A6-9E45-BD22-9347A5F03FFE}" type="datetimeFigureOut">
               <a:rPr lang="fr-FR" smtClean="0"/>
-              <a:t>08/11/2021</a:t>
+              <a:t>09/11/2021</a:t>
             </a:fld>
             <a:endParaRPr lang="fr-FR"/>
           </a:p>
@@ -4877,6 +4901,13 @@
             </a:r>
           </a:p>
           <a:p>
+            <a:pPr lvl="1"/>
+            <a:r>
+              <a:rPr lang="fr-FR" dirty="0"/>
+              <a:t>Utilisé dans la programmation évènementielle</a:t>
+            </a:r>
+          </a:p>
+          <a:p>
             <a:r>
               <a:rPr lang="fr-FR" dirty="0"/>
               <a:t>UML générique :</a:t>
@@ -4915,7 +4946,7 @@
         </p:blipFill>
         <p:spPr>
           <a:xfrm>
-            <a:off x="3200400" y="3379095"/>
+            <a:off x="4209068" y="3243262"/>
             <a:ext cx="5882640" cy="3031229"/>
           </a:xfrm>
           <a:prstGeom prst="rect">
@@ -4937,7 +4968,7 @@
         </p:nvSpPr>
         <p:spPr>
           <a:xfrm>
-            <a:off x="3531870" y="6410324"/>
+            <a:off x="4257735" y="6410324"/>
             <a:ext cx="6103620" cy="276999"/>
           </a:xfrm>
           <a:prstGeom prst="rect">
@@ -5317,6 +5348,64 @@
 </file>
 
 <file path=ppt/slides/slide6.xml><?xml version="1.0" encoding="utf-8"?>
+<p:sld xmlns:a="http://schemas.openxmlformats.org/drawingml/2006/main" xmlns:r="http://schemas.openxmlformats.org/officeDocument/2006/relationships" xmlns:p="http://schemas.openxmlformats.org/presentationml/2006/main">
+  <p:cSld>
+    <p:spTree>
+      <p:nvGrpSpPr>
+        <p:cNvPr id="1" name=""/>
+        <p:cNvGrpSpPr/>
+        <p:nvPr/>
+      </p:nvGrpSpPr>
+      <p:grpSpPr>
+        <a:xfrm>
+          <a:off x="0" y="0"/>
+          <a:ext cx="0" cy="0"/>
+          <a:chOff x="0" y="0"/>
+          <a:chExt cx="0" cy="0"/>
+        </a:xfrm>
+      </p:grpSpPr>
+      <p:sp>
+        <p:nvSpPr>
+          <p:cNvPr id="2" name="Titre 1">
+            <a:extLst>
+              <a:ext uri="{FF2B5EF4-FFF2-40B4-BE49-F238E27FC236}">
+                <a16:creationId xmlns:a16="http://schemas.microsoft.com/office/drawing/2014/main" id="{8C576343-B052-FA4F-B4B7-949A4BDDF49E}"/>
+              </a:ext>
+            </a:extLst>
+          </p:cNvPr>
+          <p:cNvSpPr>
+            <a:spLocks noGrp="1"/>
+          </p:cNvSpPr>
+          <p:nvPr>
+            <p:ph type="title"/>
+          </p:nvPr>
+        </p:nvSpPr>
+        <p:spPr/>
+        <p:txBody>
+          <a:bodyPr/>
+          <a:lstStyle/>
+          <a:p>
+            <a:r>
+              <a:rPr lang="fr-FR" dirty="0"/>
+              <a:t>Observer : Extraits de code</a:t>
+            </a:r>
+          </a:p>
+        </p:txBody>
+      </p:sp>
+    </p:spTree>
+    <p:extLst>
+      <p:ext uri="{BB962C8B-B14F-4D97-AF65-F5344CB8AC3E}">
+        <p14:creationId xmlns:p14="http://schemas.microsoft.com/office/powerpoint/2010/main" val="414114458"/>
+      </p:ext>
+    </p:extLst>
+  </p:cSld>
+  <p:clrMapOvr>
+    <a:masterClrMapping/>
+  </p:clrMapOvr>
+</p:sld>
+</file>
+
+<file path=ppt/slides/slide7.xml><?xml version="1.0" encoding="utf-8"?>
 <p:sld xmlns:a="http://schemas.openxmlformats.org/drawingml/2006/main" xmlns:r="http://schemas.openxmlformats.org/officeDocument/2006/relationships" xmlns:p="http://schemas.openxmlformats.org/presentationml/2006/main">
   <p:cSld>
     <p:spTree>

</xml_diff>

<commit_message>
Final touch on powerpoint and UML
</commit_message>
<xml_diff>
--- a/presentation.pptx
+++ b/presentation.pptx
@@ -130,7 +130,7 @@
 <file path=ppt/revisionInfo.xml><?xml version="1.0" encoding="utf-8"?>
 <p1510:revInfo xmlns:a="http://schemas.openxmlformats.org/drawingml/2006/main" xmlns:r="http://schemas.openxmlformats.org/officeDocument/2006/relationships" xmlns:p1510="http://schemas.microsoft.com/office/powerpoint/2015/10/main">
   <p1510:revLst>
-    <p1510:client id="{405757E6-D4E6-D044-98D8-0C142B7FD65C}" v="38" dt="2021-11-09T18:58:59.744"/>
+    <p1510:client id="{405757E6-D4E6-D044-98D8-0C142B7FD65C}" v="7" dt="2021-11-11T16:18:20.629"/>
   </p1510:revLst>
 </p1510:revInfo>
 </file>
@@ -140,7 +140,7 @@
   <pc:docChgLst>
     <pc:chgData name="Karl La Grassa" userId="598be429c4e50114" providerId="LiveId" clId="{405757E6-D4E6-D044-98D8-0C142B7FD65C}"/>
     <pc:docChg chg="undo redo custSel addSld modSld">
-      <pc:chgData name="Karl La Grassa" userId="598be429c4e50114" providerId="LiveId" clId="{405757E6-D4E6-D044-98D8-0C142B7FD65C}" dt="2021-11-09T19:05:55.655" v="2411" actId="20577"/>
+      <pc:chgData name="Karl La Grassa" userId="598be429c4e50114" providerId="LiveId" clId="{405757E6-D4E6-D044-98D8-0C142B7FD65C}" dt="2021-11-11T16:18:20.629" v="2418" actId="1076"/>
       <pc:docMkLst>
         <pc:docMk/>
       </pc:docMkLst>
@@ -317,7 +317,7 @@
         </pc:picChg>
       </pc:sldChg>
       <pc:sldChg chg="addSp delSp modSp new mod setBg setClrOvrMap">
-        <pc:chgData name="Karl La Grassa" userId="598be429c4e50114" providerId="LiveId" clId="{405757E6-D4E6-D044-98D8-0C142B7FD65C}" dt="2021-11-09T18:56:41.956" v="2310" actId="1076"/>
+        <pc:chgData name="Karl La Grassa" userId="598be429c4e50114" providerId="LiveId" clId="{405757E6-D4E6-D044-98D8-0C142B7FD65C}" dt="2021-11-11T16:18:20.629" v="2418" actId="1076"/>
         <pc:sldMkLst>
           <pc:docMk/>
           <pc:sldMk cId="988633631" sldId="260"/>
@@ -363,6 +363,14 @@
           </ac:grpSpMkLst>
         </pc:grpChg>
         <pc:picChg chg="add del mod">
+          <ac:chgData name="Karl La Grassa" userId="598be429c4e50114" providerId="LiveId" clId="{405757E6-D4E6-D044-98D8-0C142B7FD65C}" dt="2021-11-11T16:18:17.739" v="2416" actId="478"/>
+          <ac:picMkLst>
+            <pc:docMk/>
+            <pc:sldMk cId="988633631" sldId="260"/>
+            <ac:picMk id="3" creationId="{CBEAD852-FB54-754C-A610-3AFA5AEAAB3B}"/>
+          </ac:picMkLst>
+        </pc:picChg>
+        <pc:picChg chg="add del mod">
           <ac:chgData name="Karl La Grassa" userId="598be429c4e50114" providerId="LiveId" clId="{405757E6-D4E6-D044-98D8-0C142B7FD65C}" dt="2021-11-09T18:52:47.525" v="2301" actId="478"/>
           <ac:picMkLst>
             <pc:docMk/>
@@ -376,6 +384,14 @@
             <pc:docMk/>
             <pc:sldMk cId="988633631" sldId="260"/>
             <ac:picMk id="4" creationId="{03801F83-E364-6740-B57F-40B0EF83C5EF}"/>
+          </ac:picMkLst>
+        </pc:picChg>
+        <pc:picChg chg="add mod">
+          <ac:chgData name="Karl La Grassa" userId="598be429c4e50114" providerId="LiveId" clId="{405757E6-D4E6-D044-98D8-0C142B7FD65C}" dt="2021-11-11T16:18:20.629" v="2418" actId="1076"/>
+          <ac:picMkLst>
+            <pc:docMk/>
+            <pc:sldMk cId="988633631" sldId="260"/>
+            <ac:picMk id="4" creationId="{4C59C47A-E6DF-B74F-85C3-0CBBF1982376}"/>
           </ac:picMkLst>
         </pc:picChg>
         <pc:picChg chg="add del mod">
@@ -394,8 +410,8 @@
             <ac:picMk id="5" creationId="{32E6F9B1-ED6E-E24C-A510-4D6939BED96D}"/>
           </ac:picMkLst>
         </pc:picChg>
-        <pc:picChg chg="add mod">
-          <ac:chgData name="Karl La Grassa" userId="598be429c4e50114" providerId="LiveId" clId="{405757E6-D4E6-D044-98D8-0C142B7FD65C}" dt="2021-11-09T18:56:41.956" v="2310" actId="1076"/>
+        <pc:picChg chg="add del mod">
+          <ac:chgData name="Karl La Grassa" userId="598be429c4e50114" providerId="LiveId" clId="{405757E6-D4E6-D044-98D8-0C142B7FD65C}" dt="2021-11-11T16:16:13.176" v="2412" actId="478"/>
           <ac:picMkLst>
             <pc:docMk/>
             <pc:sldMk cId="988633631" sldId="260"/>
@@ -611,6 +627,51 @@
       </pc:sldChg>
     </pc:docChg>
   </pc:docChgLst>
+  <pc:docChgLst>
+    <pc:chgData name="Karl La Grassa" userId="598be429c4e50114" providerId="LiveId" clId="{09C47FEE-2A41-4867-B90C-060738716AF3}"/>
+    <pc:docChg chg="custSel modSld">
+      <pc:chgData name="Karl La Grassa" userId="598be429c4e50114" providerId="LiveId" clId="{09C47FEE-2A41-4867-B90C-060738716AF3}" dt="2021-11-11T16:06:43.733" v="1693" actId="20577"/>
+      <pc:docMkLst>
+        <pc:docMk/>
+      </pc:docMkLst>
+      <pc:sldChg chg="modNotesTx">
+        <pc:chgData name="Karl La Grassa" userId="598be429c4e50114" providerId="LiveId" clId="{09C47FEE-2A41-4867-B90C-060738716AF3}" dt="2021-11-11T16:06:43.733" v="1693" actId="20577"/>
+        <pc:sldMkLst>
+          <pc:docMk/>
+          <pc:sldMk cId="3461207568" sldId="257"/>
+        </pc:sldMkLst>
+      </pc:sldChg>
+      <pc:sldChg chg="modNotesTx">
+        <pc:chgData name="Karl La Grassa" userId="598be429c4e50114" providerId="LiveId" clId="{09C47FEE-2A41-4867-B90C-060738716AF3}" dt="2021-11-11T16:03:19.047" v="1605" actId="20577"/>
+        <pc:sldMkLst>
+          <pc:docMk/>
+          <pc:sldMk cId="546149401" sldId="259"/>
+        </pc:sldMkLst>
+      </pc:sldChg>
+      <pc:sldChg chg="modSp mod modNotesTx">
+        <pc:chgData name="Karl La Grassa" userId="598be429c4e50114" providerId="LiveId" clId="{09C47FEE-2A41-4867-B90C-060738716AF3}" dt="2021-11-11T15:55:57.877" v="1587" actId="27636"/>
+        <pc:sldMkLst>
+          <pc:docMk/>
+          <pc:sldMk cId="414694194" sldId="261"/>
+        </pc:sldMkLst>
+        <pc:spChg chg="mod">
+          <ac:chgData name="Karl La Grassa" userId="598be429c4e50114" providerId="LiveId" clId="{09C47FEE-2A41-4867-B90C-060738716AF3}" dt="2021-11-11T15:55:57.877" v="1587" actId="27636"/>
+          <ac:spMkLst>
+            <pc:docMk/>
+            <pc:sldMk cId="414694194" sldId="261"/>
+            <ac:spMk id="3" creationId="{1F08AC6A-A1E1-FB4E-9F38-4FC63E230478}"/>
+          </ac:spMkLst>
+        </pc:spChg>
+      </pc:sldChg>
+      <pc:sldChg chg="modNotesTx">
+        <pc:chgData name="Karl La Grassa" userId="598be429c4e50114" providerId="LiveId" clId="{09C47FEE-2A41-4867-B90C-060738716AF3}" dt="2021-11-11T15:48:29.220" v="997" actId="20577"/>
+        <pc:sldMkLst>
+          <pc:docMk/>
+          <pc:sldMk cId="414114458" sldId="262"/>
+        </pc:sldMkLst>
+      </pc:sldChg>
+    </pc:docChg>
+  </pc:docChgLst>
 </pc:chgInfo>
 </file>
 
@@ -696,7 +757,7 @@
           <a:p>
             <a:fld id="{C087B5CB-4C39-3A4F-BE4E-83ACC8C4503F}" type="datetimeFigureOut">
               <a:rPr lang="fr-FR" smtClean="0"/>
-              <a:t>09/11/2021</a:t>
+              <a:t>11/11/2021</a:t>
             </a:fld>
             <a:endParaRPr lang="fr-FR"/>
           </a:p>
@@ -1007,35 +1068,6 @@
           <a:bodyPr/>
           <a:lstStyle/>
           <a:p>
-            <a:pPr marL="0" marR="0" lvl="0" indent="0" algn="l" defTabSz="914400" rtl="0" eaLnBrk="1" fontAlgn="auto" latinLnBrk="0" hangingPunct="1">
-              <a:lnSpc>
-                <a:spcPct val="100000"/>
-              </a:lnSpc>
-              <a:spcBef>
-                <a:spcPts val="0"/>
-              </a:spcBef>
-              <a:spcAft>
-                <a:spcPts val="0"/>
-              </a:spcAft>
-              <a:buClrTx/>
-              <a:buSzTx/>
-              <a:buFontTx/>
-              <a:buNone/>
-              <a:tabLst/>
-              <a:defRPr/>
-            </a:pPr>
-            <a:r>
-              <a:rPr lang="fr-FR" dirty="0">
-                <a:solidFill>
-                  <a:srgbClr val="3F3F3F"/>
-                </a:solidFill>
-                <a:effectLst/>
-                <a:latin typeface="Helvetica" pitchFamily="2" charset="0"/>
-              </a:rPr>
-              <a:t>Les design pattern comportementaux permettent de « fluidifier » les processus de commandes et de contrôles entre les classes</a:t>
-            </a:r>
-          </a:p>
-          <a:p>
             <a:endParaRPr lang="fr-FR" dirty="0"/>
           </a:p>
         </p:txBody>
@@ -1057,7 +1089,7 @@
           <a:p>
             <a:fld id="{6465C638-4572-9440-81E7-E059EFD4A429}" type="slidenum">
               <a:rPr lang="fr-FR" smtClean="0"/>
-              <a:t>2</a:t>
+              <a:t>1</a:t>
             </a:fld>
             <a:endParaRPr lang="fr-FR"/>
           </a:p>
@@ -1066,7 +1098,7 @@
     </p:spTree>
     <p:extLst>
       <p:ext uri="{BB962C8B-B14F-4D97-AF65-F5344CB8AC3E}">
-        <p14:creationId xmlns:p14="http://schemas.microsoft.com/office/powerpoint/2010/main" val="2379607043"/>
+        <p14:creationId xmlns:p14="http://schemas.microsoft.com/office/powerpoint/2010/main" val="1452165079"/>
       </p:ext>
     </p:extLst>
   </p:cSld>
@@ -1145,11 +1177,655 @@
                 <a:effectLst/>
                 <a:latin typeface="Helvetica" pitchFamily="2" charset="0"/>
               </a:rPr>
+              <a:t>Les design pattern comportementaux permettent de « fluidifier » les processus de commandes et de contrôles entre les classes</a:t>
+            </a:r>
+          </a:p>
+          <a:p>
+            <a:pPr marL="0" marR="0" lvl="0" indent="0" algn="l" defTabSz="914400" rtl="0" eaLnBrk="1" fontAlgn="auto" latinLnBrk="0" hangingPunct="1">
+              <a:lnSpc>
+                <a:spcPct val="100000"/>
+              </a:lnSpc>
+              <a:spcBef>
+                <a:spcPts val="0"/>
+              </a:spcBef>
+              <a:spcAft>
+                <a:spcPts val="0"/>
+              </a:spcAft>
+              <a:buClrTx/>
+              <a:buSzTx/>
+              <a:buFontTx/>
+              <a:buNone/>
+              <a:tabLst/>
+              <a:defRPr/>
+            </a:pPr>
+            <a:endParaRPr lang="fr-FR" dirty="0">
+              <a:solidFill>
+                <a:srgbClr val="3F3F3F"/>
+              </a:solidFill>
+              <a:effectLst/>
+              <a:latin typeface="Helvetica" pitchFamily="2" charset="0"/>
+            </a:endParaRPr>
+          </a:p>
+          <a:p>
+            <a:pPr marL="0" marR="0" lvl="0" indent="0" algn="l" defTabSz="914400" rtl="0" eaLnBrk="1" fontAlgn="auto" latinLnBrk="0" hangingPunct="1">
+              <a:lnSpc>
+                <a:spcPct val="100000"/>
+              </a:lnSpc>
+              <a:spcBef>
+                <a:spcPts val="0"/>
+              </a:spcBef>
+              <a:spcAft>
+                <a:spcPts val="0"/>
+              </a:spcAft>
+              <a:buClrTx/>
+              <a:buSzTx/>
+              <a:buFontTx/>
+              <a:buNone/>
+              <a:tabLst/>
+              <a:defRPr/>
+            </a:pPr>
+            <a:r>
+              <a:rPr lang="fr-FR" dirty="0">
+                <a:solidFill>
+                  <a:srgbClr val="3F3F3F"/>
+                </a:solidFill>
+                <a:effectLst/>
+                <a:latin typeface="Helvetica" pitchFamily="2" charset="0"/>
+              </a:rPr>
+              <a:t>Diagramme UML : deux classes abstraites (Sujet et Observateur) </a:t>
+            </a:r>
+          </a:p>
+          <a:p>
+            <a:endParaRPr lang="fr-FR" dirty="0"/>
+          </a:p>
+        </p:txBody>
+      </p:sp>
+      <p:sp>
+        <p:nvSpPr>
+          <p:cNvPr id="4" name="Espace réservé du numéro de diapositive 3"/>
+          <p:cNvSpPr>
+            <a:spLocks noGrp="1"/>
+          </p:cNvSpPr>
+          <p:nvPr>
+            <p:ph type="sldNum" sz="quarter" idx="5"/>
+          </p:nvPr>
+        </p:nvSpPr>
+        <p:spPr/>
+        <p:txBody>
+          <a:bodyPr/>
+          <a:lstStyle/>
+          <a:p>
+            <a:fld id="{6465C638-4572-9440-81E7-E059EFD4A429}" type="slidenum">
+              <a:rPr lang="fr-FR" smtClean="0"/>
+              <a:t>2</a:t>
+            </a:fld>
+            <a:endParaRPr lang="fr-FR"/>
+          </a:p>
+        </p:txBody>
+      </p:sp>
+    </p:spTree>
+    <p:extLst>
+      <p:ext uri="{BB962C8B-B14F-4D97-AF65-F5344CB8AC3E}">
+        <p14:creationId xmlns:p14="http://schemas.microsoft.com/office/powerpoint/2010/main" val="2379607043"/>
+      </p:ext>
+    </p:extLst>
+  </p:cSld>
+  <p:clrMapOvr>
+    <a:masterClrMapping/>
+  </p:clrMapOvr>
+</p:notes>
+</file>
+
+<file path=ppt/notesSlides/notesSlide3.xml><?xml version="1.0" encoding="utf-8"?>
+<p:notes xmlns:a="http://schemas.openxmlformats.org/drawingml/2006/main" xmlns:r="http://schemas.openxmlformats.org/officeDocument/2006/relationships" xmlns:p="http://schemas.openxmlformats.org/presentationml/2006/main">
+  <p:cSld>
+    <p:spTree>
+      <p:nvGrpSpPr>
+        <p:cNvPr id="1" name=""/>
+        <p:cNvGrpSpPr/>
+        <p:nvPr/>
+      </p:nvGrpSpPr>
+      <p:grpSpPr>
+        <a:xfrm>
+          <a:off x="0" y="0"/>
+          <a:ext cx="0" cy="0"/>
+          <a:chOff x="0" y="0"/>
+          <a:chExt cx="0" cy="0"/>
+        </a:xfrm>
+      </p:grpSpPr>
+      <p:sp>
+        <p:nvSpPr>
+          <p:cNvPr id="2" name="Espace réservé de l'image des diapositives 1"/>
+          <p:cNvSpPr>
+            <a:spLocks noGrp="1" noRot="1" noChangeAspect="1"/>
+          </p:cNvSpPr>
+          <p:nvPr>
+            <p:ph type="sldImg"/>
+          </p:nvPr>
+        </p:nvSpPr>
+        <p:spPr/>
+      </p:sp>
+      <p:sp>
+        <p:nvSpPr>
+          <p:cNvPr id="3" name="Espace réservé des notes 2"/>
+          <p:cNvSpPr>
+            <a:spLocks noGrp="1"/>
+          </p:cNvSpPr>
+          <p:nvPr>
+            <p:ph type="body" idx="1"/>
+          </p:nvPr>
+        </p:nvSpPr>
+        <p:spPr/>
+        <p:txBody>
+          <a:bodyPr/>
+          <a:lstStyle/>
+          <a:p>
+            <a:r>
+              <a:rPr lang="fr-FR" dirty="0"/>
+              <a:t>-</a:t>
+            </a:r>
+          </a:p>
+        </p:txBody>
+      </p:sp>
+      <p:sp>
+        <p:nvSpPr>
+          <p:cNvPr id="4" name="Espace réservé du numéro de diapositive 3"/>
+          <p:cNvSpPr>
+            <a:spLocks noGrp="1"/>
+          </p:cNvSpPr>
+          <p:nvPr>
+            <p:ph type="sldNum" sz="quarter" idx="5"/>
+          </p:nvPr>
+        </p:nvSpPr>
+        <p:spPr/>
+        <p:txBody>
+          <a:bodyPr/>
+          <a:lstStyle/>
+          <a:p>
+            <a:fld id="{6465C638-4572-9440-81E7-E059EFD4A429}" type="slidenum">
+              <a:rPr lang="fr-FR" smtClean="0"/>
+              <a:t>4</a:t>
+            </a:fld>
+            <a:endParaRPr lang="fr-FR"/>
+          </a:p>
+        </p:txBody>
+      </p:sp>
+    </p:spTree>
+    <p:extLst>
+      <p:ext uri="{BB962C8B-B14F-4D97-AF65-F5344CB8AC3E}">
+        <p14:creationId xmlns:p14="http://schemas.microsoft.com/office/powerpoint/2010/main" val="2160659762"/>
+      </p:ext>
+    </p:extLst>
+  </p:cSld>
+  <p:clrMapOvr>
+    <a:masterClrMapping/>
+  </p:clrMapOvr>
+</p:notes>
+</file>
+
+<file path=ppt/notesSlides/notesSlide4.xml><?xml version="1.0" encoding="utf-8"?>
+<p:notes xmlns:a="http://schemas.openxmlformats.org/drawingml/2006/main" xmlns:r="http://schemas.openxmlformats.org/officeDocument/2006/relationships" xmlns:p="http://schemas.openxmlformats.org/presentationml/2006/main">
+  <p:cSld>
+    <p:spTree>
+      <p:nvGrpSpPr>
+        <p:cNvPr id="1" name=""/>
+        <p:cNvGrpSpPr/>
+        <p:nvPr/>
+      </p:nvGrpSpPr>
+      <p:grpSpPr>
+        <a:xfrm>
+          <a:off x="0" y="0"/>
+          <a:ext cx="0" cy="0"/>
+          <a:chOff x="0" y="0"/>
+          <a:chExt cx="0" cy="0"/>
+        </a:xfrm>
+      </p:grpSpPr>
+      <p:sp>
+        <p:nvSpPr>
+          <p:cNvPr id="2" name="Espace réservé de l'image des diapositives 1"/>
+          <p:cNvSpPr>
+            <a:spLocks noGrp="1" noRot="1" noChangeAspect="1"/>
+          </p:cNvSpPr>
+          <p:nvPr>
+            <p:ph type="sldImg"/>
+          </p:nvPr>
+        </p:nvSpPr>
+        <p:spPr/>
+      </p:sp>
+      <p:sp>
+        <p:nvSpPr>
+          <p:cNvPr id="3" name="Espace réservé des notes 2"/>
+          <p:cNvSpPr>
+            <a:spLocks noGrp="1"/>
+          </p:cNvSpPr>
+          <p:nvPr>
+            <p:ph type="body" idx="1"/>
+          </p:nvPr>
+        </p:nvSpPr>
+        <p:spPr/>
+        <p:txBody>
+          <a:bodyPr/>
+          <a:lstStyle/>
+          <a:p>
+            <a:pPr marL="171450" indent="-171450">
+              <a:buFontTx/>
+              <a:buChar char="-"/>
+            </a:pPr>
+            <a:r>
+              <a:rPr lang="fr-FR" dirty="0"/>
+              <a:t>Parler vite fait d’</a:t>
+            </a:r>
+            <a:r>
+              <a:rPr lang="fr-FR" dirty="0" err="1"/>
+              <a:t>Obserser</a:t>
+            </a:r>
+            <a:r>
+              <a:rPr lang="fr-FR" dirty="0"/>
+              <a:t> et </a:t>
+            </a:r>
+            <a:r>
+              <a:rPr lang="fr-FR" dirty="0" err="1"/>
+              <a:t>Subject</a:t>
+            </a:r>
+            <a:r>
+              <a:rPr lang="fr-FR" dirty="0"/>
+              <a:t> : Dire que ce sont des classes abstraites par la présence de méthode virtuelles pures. Ces classes sont génériques. Dire qu’il y a une erreur et que c’est un tableau d’observer (</a:t>
+            </a:r>
+            <a:r>
+              <a:rPr lang="fr-FR" dirty="0" err="1"/>
+              <a:t>vector</a:t>
+            </a:r>
+            <a:r>
+              <a:rPr lang="fr-FR" dirty="0"/>
+              <a:t>). Dire que c’est une erreur de développement</a:t>
+            </a:r>
+          </a:p>
+          <a:p>
+            <a:pPr marL="171450" indent="-171450">
+              <a:buFontTx/>
+              <a:buChar char="-"/>
+            </a:pPr>
+            <a:r>
+              <a:rPr lang="fr-FR" dirty="0"/>
+              <a:t>Parler des méthodes </a:t>
+            </a:r>
+            <a:r>
+              <a:rPr lang="fr-FR" dirty="0" err="1"/>
+              <a:t>Subject</a:t>
+            </a:r>
+            <a:r>
+              <a:rPr lang="fr-FR" dirty="0"/>
+              <a:t> : </a:t>
+            </a:r>
+            <a:r>
+              <a:rPr lang="fr-FR" dirty="0" err="1"/>
+              <a:t>attach</a:t>
+            </a:r>
+            <a:r>
+              <a:rPr lang="fr-FR" dirty="0"/>
+              <a:t>, </a:t>
+            </a:r>
+            <a:r>
+              <a:rPr lang="fr-FR" dirty="0" err="1"/>
+              <a:t>detach</a:t>
+            </a:r>
+            <a:r>
+              <a:rPr lang="fr-FR" dirty="0"/>
+              <a:t> et </a:t>
+            </a:r>
+            <a:r>
+              <a:rPr lang="fr-FR" dirty="0" err="1"/>
+              <a:t>notify</a:t>
+            </a:r>
+            <a:r>
+              <a:rPr lang="fr-FR" dirty="0"/>
+              <a:t> </a:t>
+            </a:r>
+          </a:p>
+          <a:p>
+            <a:pPr marL="628650" lvl="1" indent="-171450">
+              <a:buFontTx/>
+              <a:buChar char="-"/>
+            </a:pPr>
+            <a:r>
+              <a:rPr lang="fr-FR" dirty="0"/>
+              <a:t>S’attarder sur </a:t>
+            </a:r>
+            <a:r>
+              <a:rPr lang="fr-FR" dirty="0" err="1"/>
+              <a:t>attach</a:t>
+            </a:r>
+            <a:r>
+              <a:rPr lang="fr-FR" dirty="0"/>
+              <a:t> : Expliquer le </a:t>
+            </a:r>
+            <a:r>
+              <a:rPr lang="fr-FR" dirty="0" err="1"/>
+              <a:t>downcast</a:t>
+            </a:r>
+            <a:r>
+              <a:rPr lang="fr-FR" dirty="0"/>
+              <a:t> (ce n’est pas risqué car dans notre </a:t>
+            </a:r>
+            <a:r>
+              <a:rPr lang="fr-FR" dirty="0" err="1"/>
+              <a:t>vector</a:t>
+            </a:r>
+            <a:r>
+              <a:rPr lang="fr-FR" dirty="0"/>
+              <a:t> ce sont des </a:t>
+            </a:r>
+            <a:r>
+              <a:rPr lang="fr-FR" dirty="0" err="1"/>
+              <a:t>SensorManager</a:t>
+            </a:r>
+            <a:r>
+              <a:rPr lang="fr-FR" dirty="0"/>
+              <a:t>)</a:t>
+            </a:r>
+          </a:p>
+          <a:p>
+            <a:pPr marL="628650" lvl="1" indent="-171450">
+              <a:buFontTx/>
+              <a:buChar char="-"/>
+            </a:pPr>
+            <a:r>
+              <a:rPr lang="fr-FR" dirty="0"/>
+              <a:t>S’attarder sur </a:t>
+            </a:r>
+            <a:r>
+              <a:rPr lang="fr-FR" dirty="0" err="1"/>
+              <a:t>detach</a:t>
+            </a:r>
+            <a:r>
+              <a:rPr lang="fr-FR" dirty="0"/>
+              <a:t> : Rappeler qu’un itérateur est un pointeur sur un élément du </a:t>
+            </a:r>
+            <a:r>
+              <a:rPr lang="fr-FR" dirty="0" err="1"/>
+              <a:t>vector</a:t>
+            </a:r>
+            <a:r>
+              <a:rPr lang="fr-FR" dirty="0"/>
+              <a:t>, on utilise les itérateurs pour utiliser les méthodes associées (</a:t>
+            </a:r>
+            <a:r>
+              <a:rPr lang="fr-FR" dirty="0" err="1"/>
+              <a:t>erase</a:t>
+            </a:r>
+            <a:r>
+              <a:rPr lang="fr-FR" dirty="0"/>
+              <a:t>)</a:t>
+            </a:r>
+          </a:p>
+          <a:p>
+            <a:pPr marL="171450" lvl="0" indent="-171450">
+              <a:buFontTx/>
+              <a:buChar char="-"/>
+            </a:pPr>
+            <a:r>
+              <a:rPr lang="fr-FR" dirty="0"/>
+              <a:t>Parler de update : Dire qu’il peut faire des traitements spécialisés, mais qu’il ne fait que de l’affichage pour l’intérêt de la démo</a:t>
+            </a:r>
+          </a:p>
+          <a:p>
+            <a:pPr marL="628650" lvl="1" indent="-171450">
+              <a:buFontTx/>
+              <a:buChar char="-"/>
+            </a:pPr>
+            <a:endParaRPr lang="fr-FR" dirty="0"/>
+          </a:p>
+        </p:txBody>
+      </p:sp>
+      <p:sp>
+        <p:nvSpPr>
+          <p:cNvPr id="4" name="Espace réservé du numéro de diapositive 3"/>
+          <p:cNvSpPr>
+            <a:spLocks noGrp="1"/>
+          </p:cNvSpPr>
+          <p:nvPr>
+            <p:ph type="sldNum" sz="quarter" idx="5"/>
+          </p:nvPr>
+        </p:nvSpPr>
+        <p:spPr/>
+        <p:txBody>
+          <a:bodyPr/>
+          <a:lstStyle/>
+          <a:p>
+            <a:fld id="{6465C638-4572-9440-81E7-E059EFD4A429}" type="slidenum">
+              <a:rPr lang="fr-FR" smtClean="0"/>
+              <a:t>6</a:t>
+            </a:fld>
+            <a:endParaRPr lang="fr-FR"/>
+          </a:p>
+        </p:txBody>
+      </p:sp>
+    </p:spTree>
+    <p:extLst>
+      <p:ext uri="{BB962C8B-B14F-4D97-AF65-F5344CB8AC3E}">
+        <p14:creationId xmlns:p14="http://schemas.microsoft.com/office/powerpoint/2010/main" val="2222405653"/>
+      </p:ext>
+    </p:extLst>
+  </p:cSld>
+  <p:clrMapOvr>
+    <a:masterClrMapping/>
+  </p:clrMapOvr>
+</p:notes>
+</file>
+
+<file path=ppt/notesSlides/notesSlide5.xml><?xml version="1.0" encoding="utf-8"?>
+<p:notes xmlns:a="http://schemas.openxmlformats.org/drawingml/2006/main" xmlns:r="http://schemas.openxmlformats.org/officeDocument/2006/relationships" xmlns:p="http://schemas.openxmlformats.org/presentationml/2006/main">
+  <p:cSld>
+    <p:spTree>
+      <p:nvGrpSpPr>
+        <p:cNvPr id="1" name=""/>
+        <p:cNvGrpSpPr/>
+        <p:nvPr/>
+      </p:nvGrpSpPr>
+      <p:grpSpPr>
+        <a:xfrm>
+          <a:off x="0" y="0"/>
+          <a:ext cx="0" cy="0"/>
+          <a:chOff x="0" y="0"/>
+          <a:chExt cx="0" cy="0"/>
+        </a:xfrm>
+      </p:grpSpPr>
+      <p:sp>
+        <p:nvSpPr>
+          <p:cNvPr id="2" name="Espace réservé de l'image des diapositives 1"/>
+          <p:cNvSpPr>
+            <a:spLocks noGrp="1" noRot="1" noChangeAspect="1"/>
+          </p:cNvSpPr>
+          <p:nvPr>
+            <p:ph type="sldImg"/>
+          </p:nvPr>
+        </p:nvSpPr>
+        <p:spPr/>
+      </p:sp>
+      <p:sp>
+        <p:nvSpPr>
+          <p:cNvPr id="3" name="Espace réservé des notes 2"/>
+          <p:cNvSpPr>
+            <a:spLocks noGrp="1"/>
+          </p:cNvSpPr>
+          <p:nvPr>
+            <p:ph type="body" idx="1"/>
+          </p:nvPr>
+        </p:nvSpPr>
+        <p:spPr/>
+        <p:txBody>
+          <a:bodyPr/>
+          <a:lstStyle/>
+          <a:p>
+            <a:pPr marL="0" marR="0" lvl="0" indent="0" algn="l" defTabSz="914400" rtl="0" eaLnBrk="1" fontAlgn="auto" latinLnBrk="0" hangingPunct="1">
+              <a:lnSpc>
+                <a:spcPct val="100000"/>
+              </a:lnSpc>
+              <a:spcBef>
+                <a:spcPts val="0"/>
+              </a:spcBef>
+              <a:spcAft>
+                <a:spcPts val="0"/>
+              </a:spcAft>
+              <a:buClrTx/>
+              <a:buSzTx/>
+              <a:buFontTx/>
+              <a:buNone/>
+              <a:tabLst/>
+              <a:defRPr/>
+            </a:pPr>
+            <a:r>
+              <a:rPr lang="fr-FR" dirty="0">
+                <a:solidFill>
+                  <a:srgbClr val="3F3F3F"/>
+                </a:solidFill>
+                <a:effectLst/>
+                <a:latin typeface="Helvetica" pitchFamily="2" charset="0"/>
+              </a:rPr>
               <a:t>Gains de performances parce que moins de calculs, dans les systèmes embarqués cela veut dire moins de consommation donc gain d’énergie</a:t>
             </a:r>
           </a:p>
           <a:p>
             <a:endParaRPr lang="fr-FR" dirty="0"/>
+          </a:p>
+          <a:p>
+            <a:pPr marL="171450" indent="-171450">
+              <a:buFontTx/>
+              <a:buChar char="-"/>
+            </a:pPr>
+            <a:r>
+              <a:rPr lang="fr-FR" dirty="0"/>
+              <a:t>Avantages : Indépendance du sujet et de l’observateur (avec la généricité)</a:t>
+            </a:r>
+          </a:p>
+          <a:p>
+            <a:pPr marL="171450" indent="-171450">
+              <a:buFontTx/>
+              <a:buChar char="-"/>
+            </a:pPr>
+            <a:r>
+              <a:rPr lang="fr-FR" dirty="0"/>
+              <a:t>Inconvénients : Notifier de toutes les informations même les moins importantes ce qui peut gêner/créer une surcharge lorsque le nombre d’observateurs est important.</a:t>
+            </a:r>
+          </a:p>
+          <a:p>
+            <a:pPr marL="171450" indent="-171450">
+              <a:buFontTx/>
+              <a:buChar char="-"/>
+            </a:pPr>
+            <a:endParaRPr lang="fr-FR" dirty="0"/>
+          </a:p>
+          <a:p>
+            <a:pPr marL="0" indent="0">
+              <a:buFontTx/>
+              <a:buNone/>
+            </a:pPr>
+            <a:r>
+              <a:rPr lang="fr-FR" dirty="0"/>
+              <a:t>Ouvertures : </a:t>
+            </a:r>
+          </a:p>
+          <a:p>
+            <a:r>
+              <a:rPr lang="fr-FR" dirty="0"/>
+              <a:t>- </a:t>
+            </a:r>
+            <a:r>
+              <a:rPr lang="fr-FR" dirty="0" err="1"/>
+              <a:t>Publish</a:t>
+            </a:r>
+            <a:r>
+              <a:rPr lang="fr-FR" dirty="0"/>
+              <a:t> </a:t>
+            </a:r>
+            <a:r>
+              <a:rPr lang="fr-FR" dirty="0" err="1"/>
+              <a:t>subscribe</a:t>
+            </a:r>
+            <a:r>
+              <a:rPr lang="fr-FR" dirty="0"/>
+              <a:t> : Les messages sont classés par catégories (ou classes de messages) auxquelles les destinataires s’abonnent (</a:t>
+            </a:r>
+            <a:r>
+              <a:rPr lang="fr-FR" i="1" dirty="0" err="1"/>
+              <a:t>subscribe</a:t>
+            </a:r>
+            <a:r>
+              <a:rPr lang="fr-FR" dirty="0"/>
+              <a:t>)</a:t>
+            </a:r>
+            <a:r>
+              <a:rPr lang="fr-FR" baseline="30000" dirty="0">
+                <a:hlinkClick r:id="rId3"/>
+              </a:rPr>
+              <a:t>1</a:t>
+            </a:r>
+            <a:r>
+              <a:rPr lang="fr-FR" dirty="0"/>
+              <a:t>. </a:t>
+            </a:r>
+          </a:p>
+          <a:p>
+            <a:r>
+              <a:rPr lang="fr-FR" dirty="0"/>
+              <a:t>Ce mécanisme peut, entre autres, permettre de mettre en place des publications de brèves et articles, des abonnements à des flux d’information, des </a:t>
+            </a:r>
+            <a:r>
+              <a:rPr lang="fr-FR" dirty="0" err="1">
+                <a:hlinkClick r:id="rId4" tooltip="Tuple"/>
+              </a:rPr>
+              <a:t>uplets</a:t>
+            </a:r>
+            <a:r>
+              <a:rPr lang="fr-FR" dirty="0"/>
+              <a:t>, des </a:t>
+            </a:r>
+            <a:r>
+              <a:rPr lang="fr-FR" dirty="0">
+                <a:hlinkClick r:id="rId5" tooltip="Marque-page"/>
+              </a:rPr>
+              <a:t>marque-pages</a:t>
+            </a:r>
+            <a:r>
+              <a:rPr lang="fr-FR" dirty="0"/>
+              <a:t> partagés, des systèmes d’enchères et d’échanges, des catalogues en ligne, des systèmes de </a:t>
+            </a:r>
+            <a:r>
+              <a:rPr lang="fr-FR" dirty="0">
+                <a:hlinkClick r:id="rId6" tooltip="Workflow"/>
+              </a:rPr>
+              <a:t>flux de travaux</a:t>
+            </a:r>
+            <a:r>
+              <a:rPr lang="fr-FR" dirty="0"/>
+              <a:t> ou encore des notifications événements. </a:t>
+            </a:r>
+          </a:p>
+          <a:p>
+            <a:pPr marL="0" indent="0">
+              <a:buFontTx/>
+              <a:buNone/>
+            </a:pPr>
+            <a:r>
+              <a:rPr lang="fr-FR" dirty="0"/>
+              <a:t>- MVC : Quand la </a:t>
+            </a:r>
+            <a:r>
+              <a:rPr lang="fr-FR" dirty="0" err="1"/>
+              <a:t>view</a:t>
+            </a:r>
+            <a:r>
+              <a:rPr lang="fr-FR" dirty="0"/>
+              <a:t> change, le </a:t>
+            </a:r>
+            <a:r>
+              <a:rPr lang="fr-FR" dirty="0" err="1"/>
+              <a:t>controller</a:t>
+            </a:r>
+            <a:r>
+              <a:rPr lang="fr-FR" dirty="0"/>
+              <a:t> est trigger</a:t>
+            </a:r>
           </a:p>
         </p:txBody>
       </p:sp>
@@ -1358,7 +2034,7 @@
           <a:p>
             <a:fld id="{55F56711-D5A6-9E45-BD22-9347A5F03FFE}" type="datetimeFigureOut">
               <a:rPr lang="fr-FR" smtClean="0"/>
-              <a:t>09/11/2021</a:t>
+              <a:t>11/11/2021</a:t>
             </a:fld>
             <a:endParaRPr lang="fr-FR"/>
           </a:p>
@@ -1688,7 +2364,7 @@
           <a:p>
             <a:fld id="{55F56711-D5A6-9E45-BD22-9347A5F03FFE}" type="datetimeFigureOut">
               <a:rPr lang="fr-FR" smtClean="0"/>
-              <a:t>09/11/2021</a:t>
+              <a:t>11/11/2021</a:t>
             </a:fld>
             <a:endParaRPr lang="fr-FR"/>
           </a:p>
@@ -1868,7 +2544,7 @@
           <a:p>
             <a:fld id="{55F56711-D5A6-9E45-BD22-9347A5F03FFE}" type="datetimeFigureOut">
               <a:rPr lang="fr-FR" smtClean="0"/>
-              <a:t>09/11/2021</a:t>
+              <a:t>11/11/2021</a:t>
             </a:fld>
             <a:endParaRPr lang="fr-FR"/>
           </a:p>
@@ -2038,7 +2714,7 @@
           <a:p>
             <a:fld id="{55F56711-D5A6-9E45-BD22-9347A5F03FFE}" type="datetimeFigureOut">
               <a:rPr lang="fr-FR" smtClean="0"/>
-              <a:t>09/11/2021</a:t>
+              <a:t>11/11/2021</a:t>
             </a:fld>
             <a:endParaRPr lang="fr-FR"/>
           </a:p>
@@ -2315,7 +2991,7 @@
           <a:p>
             <a:fld id="{55F56711-D5A6-9E45-BD22-9347A5F03FFE}" type="datetimeFigureOut">
               <a:rPr lang="fr-FR" smtClean="0"/>
-              <a:t>09/11/2021</a:t>
+              <a:t>11/11/2021</a:t>
             </a:fld>
             <a:endParaRPr lang="fr-FR"/>
           </a:p>
@@ -2709,7 +3385,7 @@
           <a:p>
             <a:fld id="{55F56711-D5A6-9E45-BD22-9347A5F03FFE}" type="datetimeFigureOut">
               <a:rPr lang="fr-FR" smtClean="0"/>
-              <a:t>09/11/2021</a:t>
+              <a:t>11/11/2021</a:t>
             </a:fld>
             <a:endParaRPr lang="fr-FR"/>
           </a:p>
@@ -3186,7 +3862,7 @@
           <a:p>
             <a:fld id="{55F56711-D5A6-9E45-BD22-9347A5F03FFE}" type="datetimeFigureOut">
               <a:rPr lang="fr-FR" smtClean="0"/>
-              <a:t>09/11/2021</a:t>
+              <a:t>11/11/2021</a:t>
             </a:fld>
             <a:endParaRPr lang="fr-FR"/>
           </a:p>
@@ -3304,7 +3980,7 @@
           <a:p>
             <a:fld id="{55F56711-D5A6-9E45-BD22-9347A5F03FFE}" type="datetimeFigureOut">
               <a:rPr lang="fr-FR" smtClean="0"/>
-              <a:t>09/11/2021</a:t>
+              <a:t>11/11/2021</a:t>
             </a:fld>
             <a:endParaRPr lang="fr-FR"/>
           </a:p>
@@ -3399,7 +4075,7 @@
           <a:p>
             <a:fld id="{55F56711-D5A6-9E45-BD22-9347A5F03FFE}" type="datetimeFigureOut">
               <a:rPr lang="fr-FR" smtClean="0"/>
-              <a:t>09/11/2021</a:t>
+              <a:t>11/11/2021</a:t>
             </a:fld>
             <a:endParaRPr lang="fr-FR"/>
           </a:p>
@@ -3745,7 +4421,7 @@
           <a:p>
             <a:fld id="{55F56711-D5A6-9E45-BD22-9347A5F03FFE}" type="datetimeFigureOut">
               <a:rPr lang="fr-FR" smtClean="0"/>
-              <a:t>09/11/2021</a:t>
+              <a:t>11/11/2021</a:t>
             </a:fld>
             <a:endParaRPr lang="fr-FR"/>
           </a:p>
@@ -4133,7 +4809,7 @@
           <a:p>
             <a:fld id="{55F56711-D5A6-9E45-BD22-9347A5F03FFE}" type="datetimeFigureOut">
               <a:rPr lang="fr-FR" smtClean="0"/>
-              <a:t>09/11/2021</a:t>
+              <a:t>11/11/2021</a:t>
             </a:fld>
             <a:endParaRPr lang="fr-FR"/>
           </a:p>
@@ -4411,7 +5087,7 @@
           <a:p>
             <a:fld id="{55F56711-D5A6-9E45-BD22-9347A5F03FFE}" type="datetimeFigureOut">
               <a:rPr lang="fr-FR" smtClean="0"/>
-              <a:t>09/11/2021</a:t>
+              <a:t>11/11/2021</a:t>
             </a:fld>
             <a:endParaRPr lang="fr-FR"/>
           </a:p>
@@ -5415,7 +6091,7 @@
           <p:nvPr/>
         </p:nvPicPr>
         <p:blipFill>
-          <a:blip r:embed="rId2"/>
+          <a:blip r:embed="rId3"/>
           <a:stretch>
             <a:fillRect/>
           </a:stretch>
@@ -5490,10 +6166,10 @@
       </p:sp>
       <p:pic>
         <p:nvPicPr>
-          <p:cNvPr id="6" name="Image 5">
+          <p:cNvPr id="4" name="Image 3">
             <a:extLst>
               <a:ext uri="{FF2B5EF4-FFF2-40B4-BE49-F238E27FC236}">
-                <a16:creationId xmlns:a16="http://schemas.microsoft.com/office/drawing/2014/main" id="{B3FBF361-B827-0C45-BBCF-2CFFBDE3F6CC}"/>
+                <a16:creationId xmlns:a16="http://schemas.microsoft.com/office/drawing/2014/main" id="{4C59C47A-E6DF-B74F-85C3-0CBBF1982376}"/>
               </a:ext>
             </a:extLst>
           </p:cNvPr>
@@ -5510,8 +6186,8 @@
         </p:blipFill>
         <p:spPr>
           <a:xfrm>
-            <a:off x="2433981" y="1748536"/>
-            <a:ext cx="7324038" cy="4617568"/>
+            <a:off x="2175741" y="1713923"/>
+            <a:ext cx="8394700" cy="4787900"/>
           </a:xfrm>
           <a:prstGeom prst="rect">
             <a:avLst/>
@@ -5592,7 +6268,7 @@
           <p:nvPr/>
         </p:nvPicPr>
         <p:blipFill>
-          <a:blip r:embed="rId2">
+          <a:blip r:embed="rId3">
             <a:extLst>
               <a:ext uri="{28A0092B-C50C-407E-A947-70E740481C1C}">
                 <a14:useLocalDpi xmlns:a14="http://schemas.microsoft.com/office/drawing/2010/main" val="0"/>
@@ -5639,7 +6315,7 @@
           <p:nvPr/>
         </p:nvPicPr>
         <p:blipFill>
-          <a:blip r:embed="rId3">
+          <a:blip r:embed="rId4">
             <a:extLst>
               <a:ext uri="{28A0092B-C50C-407E-A947-70E740481C1C}">
                 <a14:useLocalDpi xmlns:a14="http://schemas.microsoft.com/office/drawing/2010/main" val="0"/>
@@ -5686,7 +6362,7 @@
           <p:nvPr/>
         </p:nvPicPr>
         <p:blipFill>
-          <a:blip r:embed="rId4"/>
+          <a:blip r:embed="rId5"/>
           <a:stretch>
             <a:fillRect/>
           </a:stretch>
@@ -5716,7 +6392,7 @@
           <p:nvPr/>
         </p:nvPicPr>
         <p:blipFill>
-          <a:blip r:embed="rId5"/>
+          <a:blip r:embed="rId6"/>
           <a:stretch>
             <a:fillRect/>
           </a:stretch>
@@ -5805,14 +6481,21 @@
             <p:ph idx="1"/>
           </p:nvPr>
         </p:nvSpPr>
-        <p:spPr/>
-        <p:txBody>
-          <a:bodyPr/>
+        <p:spPr>
+          <a:xfrm>
+            <a:off x="1371600" y="1877961"/>
+            <a:ext cx="9601200" cy="4294239"/>
+          </a:xfrm>
+        </p:spPr>
+        <p:txBody>
+          <a:bodyPr>
+            <a:normAutofit/>
+          </a:bodyPr>
           <a:lstStyle/>
           <a:p>
             <a:r>
               <a:rPr lang="fr-FR" dirty="0"/>
-              <a:t>Avantage du pattern : </a:t>
+              <a:t>Avantages du pattern : </a:t>
             </a:r>
           </a:p>
           <a:p>
@@ -5852,7 +6535,21 @@
               </a:rPr>
               <a:t> gains de performances, énergie (cas des systèmes embarqués)</a:t>
             </a:r>
-            <a:endParaRPr lang="fr-FR" dirty="0"/>
+          </a:p>
+          <a:p>
+            <a:r>
+              <a:rPr lang="fr-FR" dirty="0">
+                <a:sym typeface="Wingdings" pitchFamily="2" charset="2"/>
+              </a:rPr>
+              <a:t>Inconvénients :</a:t>
+            </a:r>
+          </a:p>
+          <a:p>
+            <a:pPr lvl="1"/>
+            <a:r>
+              <a:rPr lang="fr-FR" dirty="0"/>
+              <a:t>Surcharge lorsqu’un sujet doit notifier beaucoup d’observateurs sur des informations moins pertinentes</a:t>
+            </a:r>
           </a:p>
           <a:p>
             <a:r>

</xml_diff>